<commit_message>
Added LiteX installation instructions
</commit_message>
<xml_diff>
--- a/Slides/Hands_on_with_FPGA's_Module_7.pptx
+++ b/Slides/Hands_on_with_FPGA's_Module_7.pptx
@@ -134,6 +134,34 @@
     </p:ext>
   </p:extLst>
 </p:presentation>
+</file>
+
+<file path=ppt/ink/ink1.xml><?xml version="1.0" encoding="utf-8"?>
+<inkml:ink xmlns:inkml="http://www.w3.org/2003/InkML">
+  <inkml:definitions>
+    <inkml:context xml:id="ctx0">
+      <inkml:inkSource xml:id="inkSrc0">
+        <inkml:traceFormat>
+          <inkml:channel name="X" type="integer" max="3840" units="cm"/>
+          <inkml:channel name="Y" type="integer" max="2160" units="cm"/>
+          <inkml:channel name="T" type="integer" max="2.14748E9" units="dev"/>
+        </inkml:traceFormat>
+        <inkml:channelProperties>
+          <inkml:channelProperty channel="X" name="resolution" value="55.01433" units="1/cm"/>
+          <inkml:channelProperty channel="Y" name="resolution" value="54.96183" units="1/cm"/>
+          <inkml:channelProperty channel="T" name="resolution" value="1" units="1/dev"/>
+        </inkml:channelProperties>
+      </inkml:inkSource>
+      <inkml:timestamp xml:id="ts0" timeString="2022-07-27T16:44:24.524"/>
+    </inkml:context>
+    <inkml:brush xml:id="br0">
+      <inkml:brushProperty name="width" value="0.05292" units="cm"/>
+      <inkml:brushProperty name="height" value="0.05292" units="cm"/>
+      <inkml:brushProperty name="color" value="#FF0000"/>
+    </inkml:brush>
+  </inkml:definitions>
+  <inkml:trace contextRef="#ctx0" brushRef="#br0">8242 5384 0,'0'-6'109,"6"6"-93,1 0-1,19 0 1,-12 0-1,-8 0-15,8 0 16,5 6-16,-12-6 16,0 0-16,12 0 15,1 0 1,-6 0 0,5 0-16,-5 0 15,5 0-15,-5 0 16,-1 0-16,7 0 15,0 0 1,6 0-16,-19 0 16,6 0-16,13 0 15,-12 0-15,19 0 16,26 0 15,-39 0-31,0 0 0,6 0 16,-19 0-1,0 0-15,-1 0 47,7 0-47,-6 0 16,6 0 0,-6 7-1,-1-1-15,1-6 16,6 0-1,-6 0 79,0 0-78,26 0-1,-7-13 1,60-13 0,-73 19-1,-6 7 48,0-6-32,-1 6-31,1 0 16,6 0-16</inkml:trace>
+</inkml:ink>
 </file>
 
 <file path=ppt/notesMasters/notesMaster1.xml><?xml version="1.0" encoding="utf-8"?>
@@ -1124,7 +1152,7 @@
           <a:p>
             <a:fld id="{744D9575-D9E9-4973-BE78-9DBD8D05821E}" type="datetimeFigureOut">
               <a:rPr lang="en-US" smtClean="0"/>
-              <a:t>7/25/2022</a:t>
+              <a:t>7/27/2022</a:t>
             </a:fld>
             <a:endParaRPr lang="en-US"/>
           </a:p>
@@ -1304,7 +1332,7 @@
           <a:p>
             <a:fld id="{744D9575-D9E9-4973-BE78-9DBD8D05821E}" type="datetimeFigureOut">
               <a:rPr lang="en-US" smtClean="0"/>
-              <a:t>7/25/2022</a:t>
+              <a:t>7/27/2022</a:t>
             </a:fld>
             <a:endParaRPr lang="en-US"/>
           </a:p>
@@ -1494,7 +1522,7 @@
           <a:p>
             <a:fld id="{744D9575-D9E9-4973-BE78-9DBD8D05821E}" type="datetimeFigureOut">
               <a:rPr lang="en-US" smtClean="0"/>
-              <a:t>7/25/2022</a:t>
+              <a:t>7/27/2022</a:t>
             </a:fld>
             <a:endParaRPr lang="en-US"/>
           </a:p>
@@ -2041,7 +2069,7 @@
           <a:p>
             <a:fld id="{744D9575-D9E9-4973-BE78-9DBD8D05821E}" type="datetimeFigureOut">
               <a:rPr lang="en-US" smtClean="0"/>
-              <a:t>7/25/2022</a:t>
+              <a:t>7/27/2022</a:t>
             </a:fld>
             <a:endParaRPr lang="en-US"/>
           </a:p>
@@ -2297,7 +2325,7 @@
           <a:p>
             <a:fld id="{744D9575-D9E9-4973-BE78-9DBD8D05821E}" type="datetimeFigureOut">
               <a:rPr lang="en-US" smtClean="0"/>
-              <a:t>7/25/2022</a:t>
+              <a:t>7/27/2022</a:t>
             </a:fld>
             <a:endParaRPr lang="en-US"/>
           </a:p>
@@ -2539,7 +2567,7 @@
           <a:p>
             <a:fld id="{744D9575-D9E9-4973-BE78-9DBD8D05821E}" type="datetimeFigureOut">
               <a:rPr lang="en-US" smtClean="0"/>
-              <a:t>7/25/2022</a:t>
+              <a:t>7/27/2022</a:t>
             </a:fld>
             <a:endParaRPr lang="en-US"/>
           </a:p>
@@ -2916,7 +2944,7 @@
           <a:p>
             <a:fld id="{744D9575-D9E9-4973-BE78-9DBD8D05821E}" type="datetimeFigureOut">
               <a:rPr lang="en-US" smtClean="0"/>
-              <a:t>7/25/2022</a:t>
+              <a:t>7/27/2022</a:t>
             </a:fld>
             <a:endParaRPr lang="en-US"/>
           </a:p>
@@ -3044,7 +3072,7 @@
           <a:p>
             <a:fld id="{744D9575-D9E9-4973-BE78-9DBD8D05821E}" type="datetimeFigureOut">
               <a:rPr lang="en-US" smtClean="0"/>
-              <a:t>7/25/2022</a:t>
+              <a:t>7/27/2022</a:t>
             </a:fld>
             <a:endParaRPr lang="en-US"/>
           </a:p>
@@ -3149,7 +3177,7 @@
           <a:p>
             <a:fld id="{744D9575-D9E9-4973-BE78-9DBD8D05821E}" type="datetimeFigureOut">
               <a:rPr lang="en-US" smtClean="0"/>
-              <a:t>7/25/2022</a:t>
+              <a:t>7/27/2022</a:t>
             </a:fld>
             <a:endParaRPr lang="en-US"/>
           </a:p>
@@ -3436,7 +3464,7 @@
           <a:p>
             <a:fld id="{744D9575-D9E9-4973-BE78-9DBD8D05821E}" type="datetimeFigureOut">
               <a:rPr lang="en-US" smtClean="0"/>
-              <a:t>7/25/2022</a:t>
+              <a:t>7/27/2022</a:t>
             </a:fld>
             <a:endParaRPr lang="en-US"/>
           </a:p>
@@ -3703,7 +3731,7 @@
           <a:p>
             <a:fld id="{744D9575-D9E9-4973-BE78-9DBD8D05821E}" type="datetimeFigureOut">
               <a:rPr lang="en-US" smtClean="0"/>
-              <a:t>7/25/2022</a:t>
+              <a:t>7/27/2022</a:t>
             </a:fld>
             <a:endParaRPr lang="en-US"/>
           </a:p>
@@ -3926,7 +3954,7 @@
           <a:p>
             <a:fld id="{744D9575-D9E9-4973-BE78-9DBD8D05821E}" type="datetimeFigureOut">
               <a:rPr lang="en-US" smtClean="0"/>
-              <a:t>7/25/2022</a:t>
+              <a:t>7/27/2022</a:t>
             </a:fld>
             <a:endParaRPr lang="en-US"/>
           </a:p>
@@ -5963,16 +5991,16 @@
               <a:buChar char="•"/>
             </a:pPr>
             <a:r>
-              <a:rPr lang="en-US" sz="1800" dirty="0"/>
+              <a:rPr lang="en-US" sz="1200" dirty="0"/>
               <a:t>Use </a:t>
             </a:r>
             <a:r>
-              <a:rPr lang="en-US" sz="1800" dirty="0" err="1">
+              <a:rPr lang="en-US" sz="1200" dirty="0" err="1">
                 <a:hlinkClick r:id="rId2"/>
               </a:rPr>
               <a:t>LiteX</a:t>
             </a:r>
-            <a:endParaRPr lang="en-US" sz="1800" dirty="0"/>
+            <a:endParaRPr lang="en-US" sz="1200" dirty="0"/>
           </a:p>
           <a:p>
             <a:pPr>
@@ -5980,8 +6008,8 @@
               <a:buChar char="•"/>
             </a:pPr>
             <a:r>
-              <a:rPr lang="en-US" sz="1800" dirty="0"/>
-              <a:t>Follow instructions in the repo to install</a:t>
+              <a:rPr lang="en-US" sz="1200" dirty="0"/>
+              <a:t>Follow instructions below to install</a:t>
             </a:r>
           </a:p>
           <a:p>
@@ -5990,7 +6018,7 @@
               <a:buChar char="•"/>
             </a:pPr>
             <a:r>
-              <a:rPr lang="en-US" sz="1500" dirty="0"/>
+              <a:rPr lang="en-US" sz="1050" dirty="0"/>
               <a:t>For windows, use WSL!</a:t>
             </a:r>
           </a:p>
@@ -6000,34 +6028,436 @@
               <a:buChar char="•"/>
             </a:pPr>
             <a:r>
-              <a:rPr lang="en-US" sz="1500" dirty="0"/>
+              <a:rPr lang="en-US" sz="1050" dirty="0"/>
               <a:t>Will not work well in the </a:t>
             </a:r>
             <a:r>
-              <a:rPr lang="en-US" sz="1500" dirty="0" err="1"/>
+              <a:rPr lang="en-US" sz="1050" dirty="0" err="1"/>
               <a:t>Powershell</a:t>
             </a:r>
             <a:r>
-              <a:rPr lang="en-US" sz="1500" dirty="0"/>
+              <a:rPr lang="en-US" sz="1050" dirty="0"/>
               <a:t>/Command prompt</a:t>
             </a:r>
+          </a:p>
+          <a:p>
+            <a:pPr lvl="1">
+              <a:buFont typeface="Arial" panose="020B0604020202020204" pitchFamily="34" charset="0"/>
+              <a:buChar char="•"/>
+            </a:pPr>
+            <a:endParaRPr lang="en-US" sz="1050" dirty="0"/>
           </a:p>
           <a:p>
             <a:pPr>
               <a:buFont typeface="Arial" panose="020B0604020202020204" pitchFamily="34" charset="0"/>
               <a:buChar char="•"/>
             </a:pPr>
-            <a:endParaRPr lang="en-US" sz="1800" dirty="0"/>
+            <a:r>
+              <a:rPr lang="en-US" sz="1200" dirty="0"/>
+              <a:t>If you haven't set up </a:t>
+            </a:r>
+            <a:r>
+              <a:rPr lang="en-US" sz="1200" dirty="0" err="1"/>
+              <a:t>usbip</a:t>
+            </a:r>
+            <a:r>
+              <a:rPr lang="en-US" sz="1200" dirty="0"/>
+              <a:t> with WSL2 yet: https://docs.microsoft.com/en-us/windows/wsl/connect-usb</a:t>
+            </a:r>
           </a:p>
           <a:p>
             <a:pPr>
               <a:buFont typeface="Arial" panose="020B0604020202020204" pitchFamily="34" charset="0"/>
               <a:buChar char="•"/>
             </a:pPr>
-            <a:endParaRPr lang="en-US" sz="1800" dirty="0"/>
-          </a:p>
-        </p:txBody>
-      </p:sp>
+            <a:r>
+              <a:rPr lang="en-US" sz="1200" dirty="0"/>
+              <a:t>After you have the </a:t>
+            </a:r>
+            <a:r>
+              <a:rPr lang="en-US" sz="1200" dirty="0" err="1"/>
+              <a:t>upduino</a:t>
+            </a:r>
+            <a:r>
+              <a:rPr lang="en-US" sz="1200" dirty="0"/>
+              <a:t> board connected to WSL (</a:t>
+            </a:r>
+            <a:r>
+              <a:rPr lang="en-US" sz="1200" dirty="0" err="1"/>
+              <a:t>ie</a:t>
+            </a:r>
+            <a:r>
+              <a:rPr lang="en-US" sz="1200" dirty="0"/>
+              <a:t> shows up properly via </a:t>
+            </a:r>
+            <a:r>
+              <a:rPr lang="en-US" sz="1200" dirty="0" err="1"/>
+              <a:t>sudo</a:t>
+            </a:r>
+            <a:r>
+              <a:rPr lang="en-US" sz="1200" dirty="0"/>
+              <a:t> </a:t>
+            </a:r>
+            <a:r>
+              <a:rPr lang="en-US" sz="1200" dirty="0" err="1"/>
+              <a:t>dmesg</a:t>
+            </a:r>
+            <a:r>
+              <a:rPr lang="en-US" sz="1200" dirty="0"/>
+              <a:t> and/or </a:t>
+            </a:r>
+            <a:r>
+              <a:rPr lang="en-US" sz="1200" dirty="0" err="1"/>
+              <a:t>lsusb</a:t>
+            </a:r>
+            <a:r>
+              <a:rPr lang="en-US" sz="1200" dirty="0"/>
+              <a:t> , </a:t>
+            </a:r>
+            <a:r>
+              <a:rPr lang="en-US" sz="1200" dirty="0" err="1"/>
+              <a:t>udev</a:t>
+            </a:r>
+            <a:r>
+              <a:rPr lang="en-US" sz="1200" dirty="0"/>
+              <a:t> rules are present </a:t>
+            </a:r>
+            <a:r>
+              <a:rPr lang="en-US" sz="1200" dirty="0" err="1"/>
+              <a:t>etc</a:t>
+            </a:r>
+            <a:r>
+              <a:rPr lang="en-US" sz="1200" dirty="0"/>
+              <a:t>) </a:t>
+            </a:r>
+          </a:p>
+          <a:p>
+            <a:pPr>
+              <a:buFont typeface="Arial" panose="020B0604020202020204" pitchFamily="34" charset="0"/>
+              <a:buChar char="•"/>
+            </a:pPr>
+            <a:r>
+              <a:rPr lang="en-US" sz="1200" dirty="0" err="1">
+                <a:latin typeface="Courier New" panose="02070309020205020404" pitchFamily="49" charset="0"/>
+                <a:cs typeface="Courier New" panose="02070309020205020404" pitchFamily="49" charset="0"/>
+              </a:rPr>
+              <a:t>wget</a:t>
+            </a:r>
+            <a:r>
+              <a:rPr lang="en-US" sz="1200" dirty="0">
+                <a:latin typeface="Courier New" panose="02070309020205020404" pitchFamily="49" charset="0"/>
+                <a:cs typeface="Courier New" panose="02070309020205020404" pitchFamily="49" charset="0"/>
+              </a:rPr>
+              <a:t> https://raw.githubusercontent.com/enjoy-digital/litex/master/litex_setup.py &amp;&amp; </a:t>
+            </a:r>
+            <a:r>
+              <a:rPr lang="en-US" sz="1200" dirty="0" err="1">
+                <a:latin typeface="Courier New" panose="02070309020205020404" pitchFamily="49" charset="0"/>
+                <a:cs typeface="Courier New" panose="02070309020205020404" pitchFamily="49" charset="0"/>
+              </a:rPr>
+              <a:t>chmod</a:t>
+            </a:r>
+            <a:r>
+              <a:rPr lang="en-US" sz="1200" dirty="0">
+                <a:latin typeface="Courier New" panose="02070309020205020404" pitchFamily="49" charset="0"/>
+                <a:cs typeface="Courier New" panose="02070309020205020404" pitchFamily="49" charset="0"/>
+              </a:rPr>
+              <a:t> +x litex_setup.py</a:t>
+            </a:r>
+          </a:p>
+          <a:p>
+            <a:pPr>
+              <a:buFont typeface="Arial" panose="020B0604020202020204" pitchFamily="34" charset="0"/>
+              <a:buChar char="•"/>
+            </a:pPr>
+            <a:r>
+              <a:rPr lang="en-US" sz="1200" dirty="0">
+                <a:latin typeface="Courier New" panose="02070309020205020404" pitchFamily="49" charset="0"/>
+                <a:cs typeface="Courier New" panose="02070309020205020404" pitchFamily="49" charset="0"/>
+              </a:rPr>
+              <a:t>./litex_setup.py --</a:t>
+            </a:r>
+            <a:r>
+              <a:rPr lang="en-US" sz="1200" dirty="0" err="1">
+                <a:latin typeface="Courier New" panose="02070309020205020404" pitchFamily="49" charset="0"/>
+                <a:cs typeface="Courier New" panose="02070309020205020404" pitchFamily="49" charset="0"/>
+              </a:rPr>
+              <a:t>init</a:t>
+            </a:r>
+            <a:r>
+              <a:rPr lang="en-US" sz="1200" dirty="0">
+                <a:latin typeface="Courier New" panose="02070309020205020404" pitchFamily="49" charset="0"/>
+                <a:cs typeface="Courier New" panose="02070309020205020404" pitchFamily="49" charset="0"/>
+              </a:rPr>
+              <a:t> --install --user --config=full</a:t>
+            </a:r>
+          </a:p>
+          <a:p>
+            <a:pPr>
+              <a:buFont typeface="Arial" panose="020B0604020202020204" pitchFamily="34" charset="0"/>
+              <a:buChar char="•"/>
+            </a:pPr>
+            <a:r>
+              <a:rPr lang="en-US" sz="1200" dirty="0">
+                <a:latin typeface="Courier New" panose="02070309020205020404" pitchFamily="49" charset="0"/>
+                <a:cs typeface="Courier New" panose="02070309020205020404" pitchFamily="49" charset="0"/>
+              </a:rPr>
+              <a:t>./litex_setup.py --</a:t>
+            </a:r>
+            <a:r>
+              <a:rPr lang="en-US" sz="1200" dirty="0" err="1">
+                <a:latin typeface="Courier New" panose="02070309020205020404" pitchFamily="49" charset="0"/>
+                <a:cs typeface="Courier New" panose="02070309020205020404" pitchFamily="49" charset="0"/>
+              </a:rPr>
+              <a:t>gcc</a:t>
+            </a:r>
+            <a:r>
+              <a:rPr lang="en-US" sz="1200" dirty="0">
+                <a:latin typeface="Courier New" panose="02070309020205020404" pitchFamily="49" charset="0"/>
+                <a:cs typeface="Courier New" panose="02070309020205020404" pitchFamily="49" charset="0"/>
+              </a:rPr>
+              <a:t> </a:t>
+            </a:r>
+            <a:r>
+              <a:rPr lang="en-US" sz="1200" dirty="0" err="1">
+                <a:latin typeface="Courier New" panose="02070309020205020404" pitchFamily="49" charset="0"/>
+                <a:cs typeface="Courier New" panose="02070309020205020404" pitchFamily="49" charset="0"/>
+              </a:rPr>
+              <a:t>riscv</a:t>
+            </a:r>
+            <a:endParaRPr lang="en-US" sz="1200" dirty="0">
+              <a:latin typeface="Courier New" panose="02070309020205020404" pitchFamily="49" charset="0"/>
+              <a:cs typeface="Courier New" panose="02070309020205020404" pitchFamily="49" charset="0"/>
+            </a:endParaRPr>
+          </a:p>
+          <a:p>
+            <a:pPr>
+              <a:buFont typeface="Arial" panose="020B0604020202020204" pitchFamily="34" charset="0"/>
+              <a:buChar char="•"/>
+            </a:pPr>
+            <a:r>
+              <a:rPr lang="en-US" sz="1200" dirty="0">
+                <a:latin typeface="Courier New" panose="02070309020205020404" pitchFamily="49" charset="0"/>
+                <a:cs typeface="Courier New" panose="02070309020205020404" pitchFamily="49" charset="0"/>
+              </a:rPr>
+              <a:t>rm -rf </a:t>
+            </a:r>
+            <a:r>
+              <a:rPr lang="en-US" sz="1200" dirty="0" err="1">
+                <a:latin typeface="Courier New" panose="02070309020205020404" pitchFamily="49" charset="0"/>
+                <a:cs typeface="Courier New" panose="02070309020205020404" pitchFamily="49" charset="0"/>
+              </a:rPr>
+              <a:t>litex</a:t>
+            </a:r>
+            <a:r>
+              <a:rPr lang="en-US" sz="1200" dirty="0">
+                <a:latin typeface="Courier New" panose="02070309020205020404" pitchFamily="49" charset="0"/>
+                <a:cs typeface="Courier New" panose="02070309020205020404" pitchFamily="49" charset="0"/>
+              </a:rPr>
+              <a:t>-boards </a:t>
+            </a:r>
+          </a:p>
+          <a:p>
+            <a:pPr>
+              <a:buFont typeface="Arial" panose="020B0604020202020204" pitchFamily="34" charset="0"/>
+              <a:buChar char="•"/>
+            </a:pPr>
+            <a:r>
+              <a:rPr lang="en-US" sz="1200" dirty="0">
+                <a:latin typeface="Courier New" panose="02070309020205020404" pitchFamily="49" charset="0"/>
+                <a:cs typeface="Courier New" panose="02070309020205020404" pitchFamily="49" charset="0"/>
+              </a:rPr>
+              <a:t>git clone https://github.com/tinyvision-ai-inc/litex-boards </a:t>
+            </a:r>
+          </a:p>
+          <a:p>
+            <a:pPr>
+              <a:buFont typeface="Arial" panose="020B0604020202020204" pitchFamily="34" charset="0"/>
+              <a:buChar char="•"/>
+            </a:pPr>
+            <a:r>
+              <a:rPr lang="en-US" sz="1200" dirty="0">
+                <a:cs typeface="Courier New" panose="02070309020205020404" pitchFamily="49" charset="0"/>
+              </a:rPr>
+              <a:t>Install and add </a:t>
+            </a:r>
+            <a:r>
+              <a:rPr lang="en-US" sz="1200" dirty="0" err="1">
+                <a:cs typeface="Courier New" panose="02070309020205020404" pitchFamily="49" charset="0"/>
+              </a:rPr>
+              <a:t>oss</a:t>
+            </a:r>
+            <a:r>
+              <a:rPr lang="en-US" sz="1200" dirty="0">
+                <a:cs typeface="Courier New" panose="02070309020205020404" pitchFamily="49" charset="0"/>
+              </a:rPr>
+              <a:t>-cad-suite to path (if you haven't already) then exit </a:t>
+            </a:r>
+            <a:r>
+              <a:rPr lang="en-US" sz="1200" dirty="0" err="1">
+                <a:cs typeface="Courier New" panose="02070309020205020404" pitchFamily="49" charset="0"/>
+              </a:rPr>
+              <a:t>wsl</a:t>
+            </a:r>
+            <a:r>
+              <a:rPr lang="en-US" sz="1200" dirty="0">
+                <a:cs typeface="Courier New" panose="02070309020205020404" pitchFamily="49" charset="0"/>
+              </a:rPr>
+              <a:t> and open </a:t>
+            </a:r>
+            <a:r>
+              <a:rPr lang="en-US" sz="1200" dirty="0" err="1">
+                <a:cs typeface="Courier New" panose="02070309020205020404" pitchFamily="49" charset="0"/>
+              </a:rPr>
+              <a:t>powershell</a:t>
+            </a:r>
+            <a:r>
+              <a:rPr lang="en-US" sz="1200" dirty="0">
+                <a:cs typeface="Courier New" panose="02070309020205020404" pitchFamily="49" charset="0"/>
+              </a:rPr>
+              <a:t>/</a:t>
+            </a:r>
+            <a:r>
+              <a:rPr lang="en-US" sz="1200" dirty="0" err="1">
+                <a:cs typeface="Courier New" panose="02070309020205020404" pitchFamily="49" charset="0"/>
+              </a:rPr>
+              <a:t>cmd</a:t>
+            </a:r>
+            <a:r>
+              <a:rPr lang="en-US" sz="1200" dirty="0">
+                <a:cs typeface="Courier New" panose="02070309020205020404" pitchFamily="49" charset="0"/>
+              </a:rPr>
+              <a:t> </a:t>
+            </a:r>
+            <a:r>
+              <a:rPr lang="en-US" sz="1200" dirty="0" err="1">
+                <a:cs typeface="Courier New" panose="02070309020205020404" pitchFamily="49" charset="0"/>
+              </a:rPr>
+              <a:t>wsl</a:t>
+            </a:r>
+            <a:r>
+              <a:rPr lang="en-US" sz="1200" dirty="0">
+                <a:cs typeface="Courier New" panose="02070309020205020404" pitchFamily="49" charset="0"/>
+              </a:rPr>
+              <a:t> --shutdown to "reboot" the </a:t>
+            </a:r>
+            <a:r>
+              <a:rPr lang="en-US" sz="1200" dirty="0" err="1">
+                <a:cs typeface="Courier New" panose="02070309020205020404" pitchFamily="49" charset="0"/>
+              </a:rPr>
+              <a:t>linux</a:t>
+            </a:r>
+            <a:r>
+              <a:rPr lang="en-US" sz="1200" dirty="0">
+                <a:cs typeface="Courier New" panose="02070309020205020404" pitchFamily="49" charset="0"/>
+              </a:rPr>
+              <a:t> </a:t>
+            </a:r>
+            <a:r>
+              <a:rPr lang="en-US" sz="1200" dirty="0" err="1">
+                <a:cs typeface="Courier New" panose="02070309020205020404" pitchFamily="49" charset="0"/>
+              </a:rPr>
+              <a:t>vm</a:t>
+            </a:r>
+            <a:r>
+              <a:rPr lang="en-US" sz="1200" dirty="0">
+                <a:cs typeface="Courier New" panose="02070309020205020404" pitchFamily="49" charset="0"/>
+              </a:rPr>
+              <a:t>. Re-open your </a:t>
+            </a:r>
+            <a:r>
+              <a:rPr lang="en-US" sz="1200" dirty="0" err="1">
+                <a:cs typeface="Courier New" panose="02070309020205020404" pitchFamily="49" charset="0"/>
+              </a:rPr>
+              <a:t>wsl</a:t>
+            </a:r>
+            <a:r>
+              <a:rPr lang="en-US" sz="1200" dirty="0">
+                <a:cs typeface="Courier New" panose="02070309020205020404" pitchFamily="49" charset="0"/>
+              </a:rPr>
+              <a:t> terminal and ensure your upduino_v3 is still accessible </a:t>
+            </a:r>
+          </a:p>
+          <a:p>
+            <a:pPr>
+              <a:buFont typeface="Arial" panose="020B0604020202020204" pitchFamily="34" charset="0"/>
+              <a:buChar char="•"/>
+            </a:pPr>
+            <a:r>
+              <a:rPr lang="en-US" sz="1200" dirty="0">
+                <a:latin typeface="Courier New" panose="02070309020205020404" pitchFamily="49" charset="0"/>
+                <a:cs typeface="Courier New" panose="02070309020205020404" pitchFamily="49" charset="0"/>
+              </a:rPr>
+              <a:t>python3 ./litex-boards/litex_boards/targets/upduino_v3.py --</a:t>
+            </a:r>
+            <a:r>
+              <a:rPr lang="en-US" sz="1200" dirty="0" err="1">
+                <a:latin typeface="Courier New" panose="02070309020205020404" pitchFamily="49" charset="0"/>
+                <a:cs typeface="Courier New" panose="02070309020205020404" pitchFamily="49" charset="0"/>
+              </a:rPr>
+              <a:t>cpu</a:t>
+            </a:r>
+            <a:r>
+              <a:rPr lang="en-US" sz="1200" dirty="0">
+                <a:latin typeface="Courier New" panose="02070309020205020404" pitchFamily="49" charset="0"/>
+                <a:cs typeface="Courier New" panose="02070309020205020404" pitchFamily="49" charset="0"/>
+              </a:rPr>
+              <a:t>-variant minimal --build --flash</a:t>
+            </a:r>
+          </a:p>
+        </p:txBody>
+      </p:sp>
+      <mc:AlternateContent xmlns:mc="http://schemas.openxmlformats.org/markup-compatibility/2006">
+        <mc:Choice xmlns:p14="http://schemas.microsoft.com/office/powerpoint/2010/main" Requires="p14">
+          <p:contentPart p14:bwMode="auto" r:id="rId3">
+            <p14:nvContentPartPr>
+              <p14:cNvPr id="4" name="Ink 3">
+                <a:extLst>
+                  <a:ext uri="{FF2B5EF4-FFF2-40B4-BE49-F238E27FC236}">
+                    <a16:creationId xmlns:a16="http://schemas.microsoft.com/office/drawing/2014/main" id="{1F3435AD-DE33-6756-D0C8-BB0820C09F82}"/>
+                  </a:ext>
+                </a:extLst>
+              </p14:cNvPr>
+              <p14:cNvContentPartPr/>
+              <p14:nvPr/>
+            </p14:nvContentPartPr>
+            <p14:xfrm>
+              <a:off x="2967120" y="1924200"/>
+              <a:ext cx="295560" cy="19080"/>
+            </p14:xfrm>
+          </p:contentPart>
+        </mc:Choice>
+        <mc:Fallback>
+          <p:pic>
+            <p:nvPicPr>
+              <p:cNvPr id="4" name="Ink 3">
+                <a:extLst>
+                  <a:ext uri="{FF2B5EF4-FFF2-40B4-BE49-F238E27FC236}">
+                    <a16:creationId xmlns:a16="http://schemas.microsoft.com/office/drawing/2014/main" id="{1F3435AD-DE33-6756-D0C8-BB0820C09F82}"/>
+                  </a:ext>
+                </a:extLst>
+              </p:cNvPr>
+              <p:cNvPicPr/>
+              <p:nvPr/>
+            </p:nvPicPr>
+            <p:blipFill>
+              <a:blip r:embed="rId4"/>
+              <a:stretch>
+                <a:fillRect/>
+              </a:stretch>
+            </p:blipFill>
+            <p:spPr>
+              <a:xfrm>
+                <a:off x="2957760" y="1914840"/>
+                <a:ext cx="314280" cy="37800"/>
+              </a:xfrm>
+              <a:prstGeom prst="rect">
+                <a:avLst/>
+              </a:prstGeom>
+            </p:spPr>
+          </p:pic>
+        </mc:Fallback>
+      </mc:AlternateContent>
     </p:spTree>
     <p:extLst>
       <p:ext uri="{BB962C8B-B14F-4D97-AF65-F5344CB8AC3E}">
@@ -6118,6 +6548,21 @@
               <a:rPr lang="en-US" dirty="0"/>
               <a:t>Demo of auto completion</a:t>
             </a:r>
+          </a:p>
+          <a:p>
+            <a:pPr lvl="1"/>
+            <a:endParaRPr lang="en-US" dirty="0"/>
+          </a:p>
+          <a:p>
+            <a:r>
+              <a:rPr lang="en-US" dirty="0"/>
+              <a:t>Visual Studio: </a:t>
+            </a:r>
+            <a:r>
+              <a:rPr lang="en-US" dirty="0" err="1"/>
+              <a:t>TerosHDL</a:t>
+            </a:r>
+            <a:endParaRPr lang="en-US" dirty="0"/>
           </a:p>
         </p:txBody>
       </p:sp>

</xml_diff>